<commit_message>
Update Capex logic to be an initial capital outlay instead of annual deduction
</commit_message>
<xml_diff>
--- a/backend/data/templates/ic_deck_template.pptx
+++ b/backend/data/templates/ic_deck_template.pptx
@@ -12,6 +12,7 @@
     <p:sldId id="260" r:id="rId11"/>
     <p:sldId id="261" r:id="rId12"/>
     <p:sldId id="262" r:id="rId13"/>
+    <p:sldId id="263" r:id="rId14"/>
   </p:sldIdLst>
   <p:sldSz cx="9144000" cy="6858000" type="screen4x3"/>
   <p:notesSz cx="6858000" cy="9144000"/>
@@ -3420,7 +3421,7 @@
           <a:lstStyle/>
           <a:p>
             <a:r>
-              <a:t>Financial Overview &amp; Sensitivities</a:t>
+              <a:t>Financial Overview</a:t>
             </a:r>
           </a:p>
         </p:txBody>
@@ -3462,17 +3463,6 @@
           <a:p>
             <a:r>
               <a:t>Exit Yield: {{EXIT_YIELD}}</a:t>
-            </a:r>
-          </a:p>
-          <a:p/>
-          <a:p>
-            <a:r>
-              <a:t>Sensitivity Analysis:</a:t>
-            </a:r>
-          </a:p>
-          <a:p>
-            <a:r>
-              <a:t>{{SENSITIVITY_ANALYSIS}}</a:t>
             </a:r>
           </a:p>
         </p:txBody>
@@ -3486,6 +3476,66 @@
 </file>
 
 <file path=ppt/slides/slide7.xml><?xml version="1.0" encoding="utf-8"?>
+<p:sld xmlns:a="http://schemas.openxmlformats.org/drawingml/2006/main" xmlns:p="http://schemas.openxmlformats.org/presentationml/2006/main" xmlns:r="http://schemas.openxmlformats.org/officeDocument/2006/relationships">
+  <p:cSld>
+    <p:spTree>
+      <p:nvGrpSpPr>
+        <p:cNvPr id="1" name=""/>
+        <p:cNvGrpSpPr/>
+        <p:nvPr/>
+      </p:nvGrpSpPr>
+      <p:grpSpPr/>
+      <p:sp>
+        <p:nvSpPr>
+          <p:cNvPr id="2" name="Title 1"/>
+          <p:cNvSpPr>
+            <a:spLocks noGrp="1"/>
+          </p:cNvSpPr>
+          <p:nvPr>
+            <p:ph type="title"/>
+          </p:nvPr>
+        </p:nvSpPr>
+        <p:spPr/>
+        <p:txBody>
+          <a:bodyPr/>
+          <a:lstStyle/>
+          <a:p>
+            <a:r>
+              <a:t>Sensitivities</a:t>
+            </a:r>
+          </a:p>
+        </p:txBody>
+      </p:sp>
+      <p:sp>
+        <p:nvSpPr>
+          <p:cNvPr id="3" name="Content Placeholder 2"/>
+          <p:cNvSpPr>
+            <a:spLocks noGrp="1"/>
+          </p:cNvSpPr>
+          <p:nvPr>
+            <p:ph idx="1"/>
+          </p:nvPr>
+        </p:nvSpPr>
+        <p:spPr/>
+        <p:txBody>
+          <a:bodyPr/>
+          <a:lstStyle/>
+          <a:p>
+            <a:r>
+              <a:t>{{SENSITIVITY_ANALYSIS}}</a:t>
+            </a:r>
+          </a:p>
+        </p:txBody>
+      </p:sp>
+    </p:spTree>
+  </p:cSld>
+  <p:clrMapOvr>
+    <a:masterClrMapping/>
+  </p:clrMapOvr>
+</p:sld>
+</file>
+
+<file path=ppt/slides/slide8.xml><?xml version="1.0" encoding="utf-8"?>
 <p:sld xmlns:a="http://schemas.openxmlformats.org/drawingml/2006/main" xmlns:p="http://schemas.openxmlformats.org/presentationml/2006/main" xmlns:r="http://schemas.openxmlformats.org/officeDocument/2006/relationships">
   <p:cSld>
     <p:spTree>

</xml_diff>